<commit_message>
Update icon for immediate pause
</commit_message>
<xml_diff>
--- a/src/QSview/resources/icons/icons.pptx
+++ b/src/QSview/resources/icons/icons.pptx
@@ -261,7 +261,7 @@
           <a:p>
             <a:fld id="{972982F3-053C-7B4D-A5CF-EFE18F3D02A0}" type="datetimeFigureOut">
               <a:rPr lang="en-US" smtClean="0"/>
-              <a:t>10/8/25</a:t>
+              <a:t>10/10/25</a:t>
             </a:fld>
             <a:endParaRPr lang="en-US"/>
           </a:p>
@@ -459,7 +459,7 @@
           <a:p>
             <a:fld id="{972982F3-053C-7B4D-A5CF-EFE18F3D02A0}" type="datetimeFigureOut">
               <a:rPr lang="en-US" smtClean="0"/>
-              <a:t>10/8/25</a:t>
+              <a:t>10/10/25</a:t>
             </a:fld>
             <a:endParaRPr lang="en-US"/>
           </a:p>
@@ -667,7 +667,7 @@
           <a:p>
             <a:fld id="{972982F3-053C-7B4D-A5CF-EFE18F3D02A0}" type="datetimeFigureOut">
               <a:rPr lang="en-US" smtClean="0"/>
-              <a:t>10/8/25</a:t>
+              <a:t>10/10/25</a:t>
             </a:fld>
             <a:endParaRPr lang="en-US"/>
           </a:p>
@@ -865,7 +865,7 @@
           <a:p>
             <a:fld id="{972982F3-053C-7B4D-A5CF-EFE18F3D02A0}" type="datetimeFigureOut">
               <a:rPr lang="en-US" smtClean="0"/>
-              <a:t>10/8/25</a:t>
+              <a:t>10/10/25</a:t>
             </a:fld>
             <a:endParaRPr lang="en-US"/>
           </a:p>
@@ -1140,7 +1140,7 @@
           <a:p>
             <a:fld id="{972982F3-053C-7B4D-A5CF-EFE18F3D02A0}" type="datetimeFigureOut">
               <a:rPr lang="en-US" smtClean="0"/>
-              <a:t>10/8/25</a:t>
+              <a:t>10/10/25</a:t>
             </a:fld>
             <a:endParaRPr lang="en-US"/>
           </a:p>
@@ -1405,7 +1405,7 @@
           <a:p>
             <a:fld id="{972982F3-053C-7B4D-A5CF-EFE18F3D02A0}" type="datetimeFigureOut">
               <a:rPr lang="en-US" smtClean="0"/>
-              <a:t>10/8/25</a:t>
+              <a:t>10/10/25</a:t>
             </a:fld>
             <a:endParaRPr lang="en-US"/>
           </a:p>
@@ -1817,7 +1817,7 @@
           <a:p>
             <a:fld id="{972982F3-053C-7B4D-A5CF-EFE18F3D02A0}" type="datetimeFigureOut">
               <a:rPr lang="en-US" smtClean="0"/>
-              <a:t>10/8/25</a:t>
+              <a:t>10/10/25</a:t>
             </a:fld>
             <a:endParaRPr lang="en-US"/>
           </a:p>
@@ -1958,7 +1958,7 @@
           <a:p>
             <a:fld id="{972982F3-053C-7B4D-A5CF-EFE18F3D02A0}" type="datetimeFigureOut">
               <a:rPr lang="en-US" smtClean="0"/>
-              <a:t>10/8/25</a:t>
+              <a:t>10/10/25</a:t>
             </a:fld>
             <a:endParaRPr lang="en-US"/>
           </a:p>
@@ -2071,7 +2071,7 @@
           <a:p>
             <a:fld id="{972982F3-053C-7B4D-A5CF-EFE18F3D02A0}" type="datetimeFigureOut">
               <a:rPr lang="en-US" smtClean="0"/>
-              <a:t>10/8/25</a:t>
+              <a:t>10/10/25</a:t>
             </a:fld>
             <a:endParaRPr lang="en-US"/>
           </a:p>
@@ -2382,7 +2382,7 @@
           <a:p>
             <a:fld id="{972982F3-053C-7B4D-A5CF-EFE18F3D02A0}" type="datetimeFigureOut">
               <a:rPr lang="en-US" smtClean="0"/>
-              <a:t>10/8/25</a:t>
+              <a:t>10/10/25</a:t>
             </a:fld>
             <a:endParaRPr lang="en-US"/>
           </a:p>
@@ -2670,7 +2670,7 @@
           <a:p>
             <a:fld id="{972982F3-053C-7B4D-A5CF-EFE18F3D02A0}" type="datetimeFigureOut">
               <a:rPr lang="en-US" smtClean="0"/>
-              <a:t>10/8/25</a:t>
+              <a:t>10/10/25</a:t>
             </a:fld>
             <a:endParaRPr lang="en-US"/>
           </a:p>
@@ -2911,7 +2911,7 @@
           <a:p>
             <a:fld id="{972982F3-053C-7B4D-A5CF-EFE18F3D02A0}" type="datetimeFigureOut">
               <a:rPr lang="en-US" smtClean="0"/>
-              <a:t>10/8/25</a:t>
+              <a:t>10/10/25</a:t>
             </a:fld>
             <a:endParaRPr lang="en-US"/>
           </a:p>
@@ -6634,8 +6634,8 @@
           </p:blipFill>
           <p:spPr>
             <a:xfrm>
-              <a:off x="1135777" y="4796819"/>
-              <a:ext cx="914400" cy="914400"/>
+              <a:off x="1135777" y="4843746"/>
+              <a:ext cx="914400" cy="820546"/>
             </a:xfrm>
             <a:prstGeom prst="rect">
               <a:avLst/>

</xml_diff>

<commit_message>
Add RunningPlanWidget for displaying running plan information
- Create RunningPlanWidget class with basic structure
- Add running_plan.ui with QPlainTextEdit and Copy to Queue button
- Integrate RunningPlanWidget into main window (groupBox_plan)
- Remove obsolete status_1.ui file
- Update icon resources (pause_2.png, icons.pptx)
</commit_message>
<xml_diff>
--- a/src/QSview/resources/icons/icons.pptx
+++ b/src/QSview/resources/icons/icons.pptx
@@ -261,7 +261,7 @@
           <a:p>
             <a:fld id="{972982F3-053C-7B4D-A5CF-EFE18F3D02A0}" type="datetimeFigureOut">
               <a:rPr lang="en-US" smtClean="0"/>
-              <a:t>10/10/25</a:t>
+              <a:t>10/17/25</a:t>
             </a:fld>
             <a:endParaRPr lang="en-US"/>
           </a:p>
@@ -459,7 +459,7 @@
           <a:p>
             <a:fld id="{972982F3-053C-7B4D-A5CF-EFE18F3D02A0}" type="datetimeFigureOut">
               <a:rPr lang="en-US" smtClean="0"/>
-              <a:t>10/10/25</a:t>
+              <a:t>10/17/25</a:t>
             </a:fld>
             <a:endParaRPr lang="en-US"/>
           </a:p>
@@ -667,7 +667,7 @@
           <a:p>
             <a:fld id="{972982F3-053C-7B4D-A5CF-EFE18F3D02A0}" type="datetimeFigureOut">
               <a:rPr lang="en-US" smtClean="0"/>
-              <a:t>10/10/25</a:t>
+              <a:t>10/17/25</a:t>
             </a:fld>
             <a:endParaRPr lang="en-US"/>
           </a:p>
@@ -865,7 +865,7 @@
           <a:p>
             <a:fld id="{972982F3-053C-7B4D-A5CF-EFE18F3D02A0}" type="datetimeFigureOut">
               <a:rPr lang="en-US" smtClean="0"/>
-              <a:t>10/10/25</a:t>
+              <a:t>10/17/25</a:t>
             </a:fld>
             <a:endParaRPr lang="en-US"/>
           </a:p>
@@ -1140,7 +1140,7 @@
           <a:p>
             <a:fld id="{972982F3-053C-7B4D-A5CF-EFE18F3D02A0}" type="datetimeFigureOut">
               <a:rPr lang="en-US" smtClean="0"/>
-              <a:t>10/10/25</a:t>
+              <a:t>10/17/25</a:t>
             </a:fld>
             <a:endParaRPr lang="en-US"/>
           </a:p>
@@ -1405,7 +1405,7 @@
           <a:p>
             <a:fld id="{972982F3-053C-7B4D-A5CF-EFE18F3D02A0}" type="datetimeFigureOut">
               <a:rPr lang="en-US" smtClean="0"/>
-              <a:t>10/10/25</a:t>
+              <a:t>10/17/25</a:t>
             </a:fld>
             <a:endParaRPr lang="en-US"/>
           </a:p>
@@ -1817,7 +1817,7 @@
           <a:p>
             <a:fld id="{972982F3-053C-7B4D-A5CF-EFE18F3D02A0}" type="datetimeFigureOut">
               <a:rPr lang="en-US" smtClean="0"/>
-              <a:t>10/10/25</a:t>
+              <a:t>10/17/25</a:t>
             </a:fld>
             <a:endParaRPr lang="en-US"/>
           </a:p>
@@ -1958,7 +1958,7 @@
           <a:p>
             <a:fld id="{972982F3-053C-7B4D-A5CF-EFE18F3D02A0}" type="datetimeFigureOut">
               <a:rPr lang="en-US" smtClean="0"/>
-              <a:t>10/10/25</a:t>
+              <a:t>10/17/25</a:t>
             </a:fld>
             <a:endParaRPr lang="en-US"/>
           </a:p>
@@ -2071,7 +2071,7 @@
           <a:p>
             <a:fld id="{972982F3-053C-7B4D-A5CF-EFE18F3D02A0}" type="datetimeFigureOut">
               <a:rPr lang="en-US" smtClean="0"/>
-              <a:t>10/10/25</a:t>
+              <a:t>10/17/25</a:t>
             </a:fld>
             <a:endParaRPr lang="en-US"/>
           </a:p>
@@ -2382,7 +2382,7 @@
           <a:p>
             <a:fld id="{972982F3-053C-7B4D-A5CF-EFE18F3D02A0}" type="datetimeFigureOut">
               <a:rPr lang="en-US" smtClean="0"/>
-              <a:t>10/10/25</a:t>
+              <a:t>10/17/25</a:t>
             </a:fld>
             <a:endParaRPr lang="en-US"/>
           </a:p>
@@ -2670,7 +2670,7 @@
           <a:p>
             <a:fld id="{972982F3-053C-7B4D-A5CF-EFE18F3D02A0}" type="datetimeFigureOut">
               <a:rPr lang="en-US" smtClean="0"/>
-              <a:t>10/10/25</a:t>
+              <a:t>10/17/25</a:t>
             </a:fld>
             <a:endParaRPr lang="en-US"/>
           </a:p>
@@ -2911,7 +2911,7 @@
           <a:p>
             <a:fld id="{972982F3-053C-7B4D-A5CF-EFE18F3D02A0}" type="datetimeFigureOut">
               <a:rPr lang="en-US" smtClean="0"/>
-              <a:t>10/10/25</a:t>
+              <a:t>10/17/25</a:t>
             </a:fld>
             <a:endParaRPr lang="en-US"/>
           </a:p>
@@ -6643,6 +6643,99 @@
           </p:spPr>
         </p:pic>
       </p:grpSp>
+      <p:grpSp>
+        <p:nvGrpSpPr>
+          <p:cNvPr id="27" name="Group 26">
+            <a:extLst>
+              <a:ext uri="{FF2B5EF4-FFF2-40B4-BE49-F238E27FC236}">
+                <a16:creationId xmlns:a16="http://schemas.microsoft.com/office/drawing/2014/main" id="{1F069F4A-58C3-D764-EA1B-B8F2CB7DE429}"/>
+              </a:ext>
+            </a:extLst>
+          </p:cNvPr>
+          <p:cNvGrpSpPr/>
+          <p:nvPr/>
+        </p:nvGrpSpPr>
+        <p:grpSpPr>
+          <a:xfrm>
+            <a:off x="2114632" y="5601540"/>
+            <a:ext cx="1528500" cy="820546"/>
+            <a:chOff x="2114632" y="5601540"/>
+            <a:chExt cx="1528500" cy="820546"/>
+          </a:xfrm>
+        </p:grpSpPr>
+        <p:pic>
+          <p:nvPicPr>
+            <p:cNvPr id="25" name="Graphic 24" descr="Exclamation mark with solid fill">
+              <a:extLst>
+                <a:ext uri="{FF2B5EF4-FFF2-40B4-BE49-F238E27FC236}">
+                  <a16:creationId xmlns:a16="http://schemas.microsoft.com/office/drawing/2014/main" id="{E9562AEF-71EE-4538-F28A-2675916A3591}"/>
+                </a:ext>
+              </a:extLst>
+            </p:cNvPr>
+            <p:cNvPicPr>
+              <a:picLocks noChangeAspect="1"/>
+            </p:cNvPicPr>
+            <p:nvPr/>
+          </p:nvPicPr>
+          <p:blipFill>
+            <a:blip r:embed="rId23">
+              <a:extLst>
+                <a:ext uri="{96DAC541-7B7A-43D3-8B79-37D633B846F1}">
+                  <asvg:svgBlip xmlns:asvg="http://schemas.microsoft.com/office/drawing/2016/SVG/main" r:embed="rId24"/>
+                </a:ext>
+              </a:extLst>
+            </a:blip>
+            <a:stretch>
+              <a:fillRect/>
+            </a:stretch>
+          </p:blipFill>
+          <p:spPr>
+            <a:xfrm>
+              <a:off x="2114632" y="5601540"/>
+              <a:ext cx="1228199" cy="820546"/>
+            </a:xfrm>
+            <a:prstGeom prst="rect">
+              <a:avLst/>
+            </a:prstGeom>
+          </p:spPr>
+        </p:pic>
+        <p:pic>
+          <p:nvPicPr>
+            <p:cNvPr id="26" name="Graphic 25" descr="Exclamation mark with solid fill">
+              <a:extLst>
+                <a:ext uri="{FF2B5EF4-FFF2-40B4-BE49-F238E27FC236}">
+                  <a16:creationId xmlns:a16="http://schemas.microsoft.com/office/drawing/2014/main" id="{FC0D6C37-9461-7A0C-B039-24C4E9928A22}"/>
+                </a:ext>
+              </a:extLst>
+            </p:cNvPr>
+            <p:cNvPicPr>
+              <a:picLocks noChangeAspect="1"/>
+            </p:cNvPicPr>
+            <p:nvPr/>
+          </p:nvPicPr>
+          <p:blipFill>
+            <a:blip r:embed="rId23">
+              <a:extLst>
+                <a:ext uri="{96DAC541-7B7A-43D3-8B79-37D633B846F1}">
+                  <asvg:svgBlip xmlns:asvg="http://schemas.microsoft.com/office/drawing/2016/SVG/main" r:embed="rId24"/>
+                </a:ext>
+              </a:extLst>
+            </a:blip>
+            <a:stretch>
+              <a:fillRect/>
+            </a:stretch>
+          </p:blipFill>
+          <p:spPr>
+            <a:xfrm>
+              <a:off x="2414933" y="5601540"/>
+              <a:ext cx="1228199" cy="820546"/>
+            </a:xfrm>
+            <a:prstGeom prst="rect">
+              <a:avLst/>
+            </a:prstGeom>
+          </p:spPr>
+        </p:pic>
+      </p:grpSp>
     </p:spTree>
     <p:extLst>
       <p:ext uri="{BB962C8B-B14F-4D97-AF65-F5344CB8AC3E}">

</xml_diff>

<commit_message>
Add grey LED for RE env when there is no connection
</commit_message>
<xml_diff>
--- a/src/QSview/resources/icons/icons.pptx
+++ b/src/QSview/resources/icons/icons.pptx
@@ -8,6 +8,7 @@
     <p:sldId id="3912" r:id="rId2"/>
     <p:sldId id="3913" r:id="rId3"/>
     <p:sldId id="3914" r:id="rId4"/>
+    <p:sldId id="3915" r:id="rId5"/>
   </p:sldIdLst>
   <p:sldSz cx="12192000" cy="6858000"/>
   <p:notesSz cx="6858000" cy="9144000"/>
@@ -261,7 +262,7 @@
           <a:p>
             <a:fld id="{972982F3-053C-7B4D-A5CF-EFE18F3D02A0}" type="datetimeFigureOut">
               <a:rPr lang="en-US" smtClean="0"/>
-              <a:t>10/17/25</a:t>
+              <a:t>12/5/25</a:t>
             </a:fld>
             <a:endParaRPr lang="en-US"/>
           </a:p>
@@ -459,7 +460,7 @@
           <a:p>
             <a:fld id="{972982F3-053C-7B4D-A5CF-EFE18F3D02A0}" type="datetimeFigureOut">
               <a:rPr lang="en-US" smtClean="0"/>
-              <a:t>10/17/25</a:t>
+              <a:t>12/5/25</a:t>
             </a:fld>
             <a:endParaRPr lang="en-US"/>
           </a:p>
@@ -667,7 +668,7 @@
           <a:p>
             <a:fld id="{972982F3-053C-7B4D-A5CF-EFE18F3D02A0}" type="datetimeFigureOut">
               <a:rPr lang="en-US" smtClean="0"/>
-              <a:t>10/17/25</a:t>
+              <a:t>12/5/25</a:t>
             </a:fld>
             <a:endParaRPr lang="en-US"/>
           </a:p>
@@ -865,7 +866,7 @@
           <a:p>
             <a:fld id="{972982F3-053C-7B4D-A5CF-EFE18F3D02A0}" type="datetimeFigureOut">
               <a:rPr lang="en-US" smtClean="0"/>
-              <a:t>10/17/25</a:t>
+              <a:t>12/5/25</a:t>
             </a:fld>
             <a:endParaRPr lang="en-US"/>
           </a:p>
@@ -1140,7 +1141,7 @@
           <a:p>
             <a:fld id="{972982F3-053C-7B4D-A5CF-EFE18F3D02A0}" type="datetimeFigureOut">
               <a:rPr lang="en-US" smtClean="0"/>
-              <a:t>10/17/25</a:t>
+              <a:t>12/5/25</a:t>
             </a:fld>
             <a:endParaRPr lang="en-US"/>
           </a:p>
@@ -1405,7 +1406,7 @@
           <a:p>
             <a:fld id="{972982F3-053C-7B4D-A5CF-EFE18F3D02A0}" type="datetimeFigureOut">
               <a:rPr lang="en-US" smtClean="0"/>
-              <a:t>10/17/25</a:t>
+              <a:t>12/5/25</a:t>
             </a:fld>
             <a:endParaRPr lang="en-US"/>
           </a:p>
@@ -1817,7 +1818,7 @@
           <a:p>
             <a:fld id="{972982F3-053C-7B4D-A5CF-EFE18F3D02A0}" type="datetimeFigureOut">
               <a:rPr lang="en-US" smtClean="0"/>
-              <a:t>10/17/25</a:t>
+              <a:t>12/5/25</a:t>
             </a:fld>
             <a:endParaRPr lang="en-US"/>
           </a:p>
@@ -1958,7 +1959,7 @@
           <a:p>
             <a:fld id="{972982F3-053C-7B4D-A5CF-EFE18F3D02A0}" type="datetimeFigureOut">
               <a:rPr lang="en-US" smtClean="0"/>
-              <a:t>10/17/25</a:t>
+              <a:t>12/5/25</a:t>
             </a:fld>
             <a:endParaRPr lang="en-US"/>
           </a:p>
@@ -2071,7 +2072,7 @@
           <a:p>
             <a:fld id="{972982F3-053C-7B4D-A5CF-EFE18F3D02A0}" type="datetimeFigureOut">
               <a:rPr lang="en-US" smtClean="0"/>
-              <a:t>10/17/25</a:t>
+              <a:t>12/5/25</a:t>
             </a:fld>
             <a:endParaRPr lang="en-US"/>
           </a:p>
@@ -2382,7 +2383,7 @@
           <a:p>
             <a:fld id="{972982F3-053C-7B4D-A5CF-EFE18F3D02A0}" type="datetimeFigureOut">
               <a:rPr lang="en-US" smtClean="0"/>
-              <a:t>10/17/25</a:t>
+              <a:t>12/5/25</a:t>
             </a:fld>
             <a:endParaRPr lang="en-US"/>
           </a:p>
@@ -2670,7 +2671,7 @@
           <a:p>
             <a:fld id="{972982F3-053C-7B4D-A5CF-EFE18F3D02A0}" type="datetimeFigureOut">
               <a:rPr lang="en-US" smtClean="0"/>
-              <a:t>10/17/25</a:t>
+              <a:t>12/5/25</a:t>
             </a:fld>
             <a:endParaRPr lang="en-US"/>
           </a:p>
@@ -2911,7 +2912,7 @@
           <a:p>
             <a:fld id="{972982F3-053C-7B4D-A5CF-EFE18F3D02A0}" type="datetimeFigureOut">
               <a:rPr lang="en-US" smtClean="0"/>
-              <a:t>10/17/25</a:t>
+              <a:t>12/5/25</a:t>
             </a:fld>
             <a:endParaRPr lang="en-US"/>
           </a:p>
@@ -6749,6 +6750,380 @@
 </p:sld>
 </file>
 
+<file path=ppt/slides/slide4.xml><?xml version="1.0" encoding="utf-8"?>
+<p:sld xmlns:a="http://schemas.openxmlformats.org/drawingml/2006/main" xmlns:r="http://schemas.openxmlformats.org/officeDocument/2006/relationships" xmlns:p="http://schemas.openxmlformats.org/presentationml/2006/main">
+  <p:cSld>
+    <p:spTree>
+      <p:nvGrpSpPr>
+        <p:cNvPr id="1" name=""/>
+        <p:cNvGrpSpPr/>
+        <p:nvPr/>
+      </p:nvGrpSpPr>
+      <p:grpSpPr>
+        <a:xfrm>
+          <a:off x="0" y="0"/>
+          <a:ext cx="0" cy="0"/>
+          <a:chOff x="0" y="0"/>
+          <a:chExt cx="0" cy="0"/>
+        </a:xfrm>
+      </p:grpSpPr>
+      <p:pic>
+        <p:nvPicPr>
+          <p:cNvPr id="3" name="Picture 2" descr="Icon&#10;&#10;AI-generated content may be incorrect.">
+            <a:extLst>
+              <a:ext uri="{FF2B5EF4-FFF2-40B4-BE49-F238E27FC236}">
+                <a16:creationId xmlns:a16="http://schemas.microsoft.com/office/drawing/2014/main" id="{722CAA21-7A98-C00C-4496-DD25E75B18DD}"/>
+              </a:ext>
+            </a:extLst>
+          </p:cNvPr>
+          <p:cNvPicPr>
+            <a:picLocks noChangeAspect="1"/>
+          </p:cNvPicPr>
+          <p:nvPr/>
+        </p:nvPicPr>
+        <p:blipFill>
+          <a:blip r:embed="rId2"/>
+          <a:stretch>
+            <a:fillRect/>
+          </a:stretch>
+        </p:blipFill>
+        <p:spPr>
+          <a:xfrm>
+            <a:off x="1125330" y="3429000"/>
+            <a:ext cx="1146432" cy="1146432"/>
+          </a:xfrm>
+          <a:prstGeom prst="rect">
+            <a:avLst/>
+          </a:prstGeom>
+        </p:spPr>
+      </p:pic>
+      <p:grpSp>
+        <p:nvGrpSpPr>
+          <p:cNvPr id="6" name="Group 5">
+            <a:extLst>
+              <a:ext uri="{FF2B5EF4-FFF2-40B4-BE49-F238E27FC236}">
+                <a16:creationId xmlns:a16="http://schemas.microsoft.com/office/drawing/2014/main" id="{396030D2-6684-4271-D3B3-74C93A82BA71}"/>
+              </a:ext>
+            </a:extLst>
+          </p:cNvPr>
+          <p:cNvGrpSpPr/>
+          <p:nvPr/>
+        </p:nvGrpSpPr>
+        <p:grpSpPr>
+          <a:xfrm>
+            <a:off x="4822568" y="2409568"/>
+            <a:ext cx="1146432" cy="1146432"/>
+            <a:chOff x="4822568" y="2409568"/>
+            <a:chExt cx="1146432" cy="1146432"/>
+          </a:xfrm>
+        </p:grpSpPr>
+        <p:sp>
+          <p:nvSpPr>
+            <p:cNvPr id="4" name="Rectangle 3">
+              <a:extLst>
+                <a:ext uri="{FF2B5EF4-FFF2-40B4-BE49-F238E27FC236}">
+                  <a16:creationId xmlns:a16="http://schemas.microsoft.com/office/drawing/2014/main" id="{2E141746-4870-0411-1AC1-E50A8A346FBC}"/>
+                </a:ext>
+              </a:extLst>
+            </p:cNvPr>
+            <p:cNvSpPr/>
+            <p:nvPr/>
+          </p:nvSpPr>
+          <p:spPr>
+            <a:xfrm>
+              <a:off x="4822568" y="2409568"/>
+              <a:ext cx="1146432" cy="1146432"/>
+            </a:xfrm>
+            <a:prstGeom prst="rect">
+              <a:avLst/>
+            </a:prstGeom>
+            <a:solidFill>
+              <a:schemeClr val="bg2">
+                <a:lumMod val="90000"/>
+              </a:schemeClr>
+            </a:solidFill>
+            <a:ln>
+              <a:noFill/>
+            </a:ln>
+          </p:spPr>
+          <p:style>
+            <a:lnRef idx="2">
+              <a:schemeClr val="accent1">
+                <a:shade val="15000"/>
+              </a:schemeClr>
+            </a:lnRef>
+            <a:fillRef idx="1">
+              <a:schemeClr val="accent1"/>
+            </a:fillRef>
+            <a:effectRef idx="0">
+              <a:schemeClr val="accent1"/>
+            </a:effectRef>
+            <a:fontRef idx="minor">
+              <a:schemeClr val="lt1"/>
+            </a:fontRef>
+          </p:style>
+          <p:txBody>
+            <a:bodyPr rtlCol="0" anchor="ctr"/>
+            <a:lstStyle/>
+            <a:p>
+              <a:pPr algn="ctr"/>
+              <a:endParaRPr lang="en-US"/>
+            </a:p>
+          </p:txBody>
+        </p:sp>
+        <p:sp>
+          <p:nvSpPr>
+            <p:cNvPr id="5" name="Oval 4">
+              <a:extLst>
+                <a:ext uri="{FF2B5EF4-FFF2-40B4-BE49-F238E27FC236}">
+                  <a16:creationId xmlns:a16="http://schemas.microsoft.com/office/drawing/2014/main" id="{D464903C-9921-74B3-0580-A37809F41086}"/>
+                </a:ext>
+              </a:extLst>
+            </p:cNvPr>
+            <p:cNvSpPr>
+              <a:spLocks noChangeAspect="1"/>
+            </p:cNvSpPr>
+            <p:nvPr/>
+          </p:nvSpPr>
+          <p:spPr>
+            <a:xfrm>
+              <a:off x="4956872" y="2551176"/>
+              <a:ext cx="877824" cy="877824"/>
+            </a:xfrm>
+            <a:prstGeom prst="ellipse">
+              <a:avLst/>
+            </a:prstGeom>
+            <a:solidFill>
+              <a:schemeClr val="bg1">
+                <a:lumMod val="65000"/>
+              </a:schemeClr>
+            </a:solidFill>
+            <a:ln w="38100">
+              <a:solidFill>
+                <a:schemeClr val="tx1">
+                  <a:lumMod val="50000"/>
+                  <a:lumOff val="50000"/>
+                </a:schemeClr>
+              </a:solidFill>
+            </a:ln>
+          </p:spPr>
+          <p:style>
+            <a:lnRef idx="2">
+              <a:schemeClr val="accent1">
+                <a:shade val="15000"/>
+              </a:schemeClr>
+            </a:lnRef>
+            <a:fillRef idx="1">
+              <a:schemeClr val="accent1"/>
+            </a:fillRef>
+            <a:effectRef idx="0">
+              <a:schemeClr val="accent1"/>
+            </a:effectRef>
+            <a:fontRef idx="minor">
+              <a:schemeClr val="lt1"/>
+            </a:fontRef>
+          </p:style>
+          <p:txBody>
+            <a:bodyPr rtlCol="0" anchor="ctr"/>
+            <a:lstStyle/>
+            <a:p>
+              <a:pPr algn="ctr"/>
+              <a:endParaRPr lang="en-US"/>
+            </a:p>
+          </p:txBody>
+        </p:sp>
+      </p:grpSp>
+      <p:grpSp>
+        <p:nvGrpSpPr>
+          <p:cNvPr id="8" name="Group 7">
+            <a:extLst>
+              <a:ext uri="{FF2B5EF4-FFF2-40B4-BE49-F238E27FC236}">
+                <a16:creationId xmlns:a16="http://schemas.microsoft.com/office/drawing/2014/main" id="{FA8832B0-C71D-2241-FADB-CE20DCE90556}"/>
+              </a:ext>
+            </a:extLst>
+          </p:cNvPr>
+          <p:cNvGrpSpPr/>
+          <p:nvPr/>
+        </p:nvGrpSpPr>
+        <p:grpSpPr>
+          <a:xfrm>
+            <a:off x="2407574" y="3429001"/>
+            <a:ext cx="1143000" cy="1146431"/>
+            <a:chOff x="2407574" y="3429001"/>
+            <a:chExt cx="1143000" cy="1146431"/>
+          </a:xfrm>
+        </p:grpSpPr>
+        <p:sp>
+          <p:nvSpPr>
+            <p:cNvPr id="2" name="Oval 1">
+              <a:extLst>
+                <a:ext uri="{FF2B5EF4-FFF2-40B4-BE49-F238E27FC236}">
+                  <a16:creationId xmlns:a16="http://schemas.microsoft.com/office/drawing/2014/main" id="{5B01350A-C56E-B3B0-21B8-A9C81A14ABD8}"/>
+                </a:ext>
+              </a:extLst>
+            </p:cNvPr>
+            <p:cNvSpPr>
+              <a:spLocks/>
+            </p:cNvSpPr>
+            <p:nvPr/>
+          </p:nvSpPr>
+          <p:spPr>
+            <a:xfrm>
+              <a:off x="2407574" y="3429001"/>
+              <a:ext cx="1143000" cy="1146431"/>
+            </a:xfrm>
+            <a:prstGeom prst="ellipse">
+              <a:avLst/>
+            </a:prstGeom>
+            <a:gradFill flip="none" rotWithShape="1">
+              <a:gsLst>
+                <a:gs pos="0">
+                  <a:schemeClr val="bg1">
+                    <a:lumMod val="65000"/>
+                  </a:schemeClr>
+                </a:gs>
+                <a:gs pos="72000">
+                  <a:schemeClr val="bg1">
+                    <a:lumMod val="75000"/>
+                    <a:tint val="44500"/>
+                    <a:satMod val="160000"/>
+                  </a:schemeClr>
+                </a:gs>
+                <a:gs pos="100000">
+                  <a:schemeClr val="bg1">
+                    <a:lumMod val="75000"/>
+                    <a:tint val="23500"/>
+                    <a:satMod val="160000"/>
+                  </a:schemeClr>
+                </a:gs>
+              </a:gsLst>
+              <a:lin ang="5400000" scaled="1"/>
+              <a:tileRect/>
+            </a:gradFill>
+            <a:ln w="38100">
+              <a:noFill/>
+            </a:ln>
+          </p:spPr>
+          <p:style>
+            <a:lnRef idx="2">
+              <a:schemeClr val="accent1">
+                <a:shade val="15000"/>
+              </a:schemeClr>
+            </a:lnRef>
+            <a:fillRef idx="1">
+              <a:schemeClr val="accent1"/>
+            </a:fillRef>
+            <a:effectRef idx="0">
+              <a:schemeClr val="accent1"/>
+            </a:effectRef>
+            <a:fontRef idx="minor">
+              <a:schemeClr val="lt1"/>
+            </a:fontRef>
+          </p:style>
+          <p:txBody>
+            <a:bodyPr rtlCol="0" anchor="ctr"/>
+            <a:lstStyle/>
+            <a:p>
+              <a:pPr algn="ctr"/>
+              <a:endParaRPr lang="en-US"/>
+            </a:p>
+          </p:txBody>
+        </p:sp>
+        <p:sp>
+          <p:nvSpPr>
+            <p:cNvPr id="7" name="Oval 6">
+              <a:extLst>
+                <a:ext uri="{FF2B5EF4-FFF2-40B4-BE49-F238E27FC236}">
+                  <a16:creationId xmlns:a16="http://schemas.microsoft.com/office/drawing/2014/main" id="{BD565B0D-561D-23B4-647D-79202724F352}"/>
+                </a:ext>
+              </a:extLst>
+            </p:cNvPr>
+            <p:cNvSpPr>
+              <a:spLocks noChangeAspect="1"/>
+            </p:cNvSpPr>
+            <p:nvPr/>
+          </p:nvSpPr>
+          <p:spPr>
+            <a:xfrm rot="19592009">
+              <a:off x="2535037" y="3556000"/>
+              <a:ext cx="877824" cy="877824"/>
+            </a:xfrm>
+            <a:prstGeom prst="ellipse">
+              <a:avLst/>
+            </a:prstGeom>
+            <a:gradFill flip="none" rotWithShape="1">
+              <a:gsLst>
+                <a:gs pos="0">
+                  <a:schemeClr val="accent3">
+                    <a:lumMod val="0"/>
+                    <a:lumOff val="100000"/>
+                  </a:schemeClr>
+                </a:gs>
+                <a:gs pos="35000">
+                  <a:schemeClr val="accent3">
+                    <a:lumMod val="0"/>
+                    <a:lumOff val="100000"/>
+                  </a:schemeClr>
+                </a:gs>
+                <a:gs pos="86000">
+                  <a:schemeClr val="accent3">
+                    <a:lumMod val="100000"/>
+                  </a:schemeClr>
+                </a:gs>
+              </a:gsLst>
+              <a:path path="circle">
+                <a:fillToRect l="50000" t="-80000" r="50000" b="180000"/>
+              </a:path>
+              <a:tileRect/>
+            </a:gradFill>
+            <a:ln w="38100">
+              <a:solidFill>
+                <a:schemeClr val="tx1">
+                  <a:lumMod val="50000"/>
+                  <a:lumOff val="50000"/>
+                </a:schemeClr>
+              </a:solidFill>
+            </a:ln>
+          </p:spPr>
+          <p:style>
+            <a:lnRef idx="2">
+              <a:schemeClr val="accent1">
+                <a:shade val="15000"/>
+              </a:schemeClr>
+            </a:lnRef>
+            <a:fillRef idx="1">
+              <a:schemeClr val="accent1"/>
+            </a:fillRef>
+            <a:effectRef idx="0">
+              <a:schemeClr val="accent1"/>
+            </a:effectRef>
+            <a:fontRef idx="minor">
+              <a:schemeClr val="lt1"/>
+            </a:fontRef>
+          </p:style>
+          <p:txBody>
+            <a:bodyPr rtlCol="0" anchor="ctr"/>
+            <a:lstStyle/>
+            <a:p>
+              <a:pPr algn="ctr"/>
+              <a:endParaRPr lang="en-US"/>
+            </a:p>
+          </p:txBody>
+        </p:sp>
+      </p:grpSp>
+    </p:spTree>
+    <p:extLst>
+      <p:ext uri="{BB962C8B-B14F-4D97-AF65-F5344CB8AC3E}">
+        <p14:creationId xmlns:p14="http://schemas.microsoft.com/office/powerpoint/2010/main" val="1807274403"/>
+      </p:ext>
+    </p:extLst>
+  </p:cSld>
+  <p:clrMapOvr>
+    <a:masterClrMapping/>
+  </p:clrMapOvr>
+</p:sld>
+</file>
+
 <file path=ppt/theme/theme1.xml><?xml version="1.0" encoding="utf-8"?>
 <a:theme xmlns:a="http://schemas.openxmlformats.org/drawingml/2006/main" name="Office Theme">
   <a:themeElements>

</xml_diff>